<commit_message>
Kontrolle von SYP Projekt
</commit_message>
<xml_diff>
--- a/Präsentation/SPY-Projekt-Ideen.pptx
+++ b/Präsentation/SPY-Projekt-Ideen.pptx
@@ -5315,13 +5315,13 @@
   <p:clrMapOvr>
     <a:masterClrMapping/>
   </p:clrMapOvr>
-  <mc:AlternateContent xmlns:mc="http://schemas.openxmlformats.org/markup-compatibility/2006">
-    <mc:Choice xmlns:p159="http://schemas.microsoft.com/office/powerpoint/2015/09/main" Requires="p159">
+  <mc:AlternateContent xmlns:mc="http://schemas.openxmlformats.org/markup-compatibility/2006" xmlns:p159="http://schemas.microsoft.com/office/powerpoint/2015/09/main">
+    <mc:Choice Requires="p159">
       <p:transition xmlns:p14="http://schemas.microsoft.com/office/powerpoint/2010/main" spd="slow" p14:dur="2000">
         <p159:morph option="byObject"/>
       </p:transition>
     </mc:Choice>
-    <mc:Fallback>
+    <mc:Fallback xmlns="">
       <p:transition spd="slow">
         <p:fade/>
       </p:transition>
@@ -6234,13 +6234,13 @@
   <p:clrMapOvr>
     <a:masterClrMapping/>
   </p:clrMapOvr>
-  <mc:AlternateContent xmlns:mc="http://schemas.openxmlformats.org/markup-compatibility/2006">
-    <mc:Choice xmlns:p159="http://schemas.microsoft.com/office/powerpoint/2015/09/main" Requires="p159">
+  <mc:AlternateContent xmlns:mc="http://schemas.openxmlformats.org/markup-compatibility/2006" xmlns:p159="http://schemas.microsoft.com/office/powerpoint/2015/09/main">
+    <mc:Choice Requires="p159">
       <p:transition xmlns:p14="http://schemas.microsoft.com/office/powerpoint/2010/main" spd="slow" p14:dur="2000">
         <p159:morph option="byObject"/>
       </p:transition>
     </mc:Choice>
-    <mc:Fallback>
+    <mc:Fallback xmlns="">
       <p:transition spd="slow">
         <p:fade/>
       </p:transition>
@@ -7316,13 +7316,13 @@
   <p:clrMapOvr>
     <a:masterClrMapping/>
   </p:clrMapOvr>
-  <mc:AlternateContent xmlns:mc="http://schemas.openxmlformats.org/markup-compatibility/2006">
-    <mc:Choice xmlns:p159="http://schemas.microsoft.com/office/powerpoint/2015/09/main" Requires="p159">
+  <mc:AlternateContent xmlns:mc="http://schemas.openxmlformats.org/markup-compatibility/2006" xmlns:p159="http://schemas.microsoft.com/office/powerpoint/2015/09/main">
+    <mc:Choice Requires="p159">
       <p:transition xmlns:p14="http://schemas.microsoft.com/office/powerpoint/2010/main" spd="slow" p14:dur="2000">
         <p159:morph option="byObject"/>
       </p:transition>
     </mc:Choice>
-    <mc:Fallback>
+    <mc:Fallback xmlns="">
       <p:transition spd="slow">
         <p:fade/>
       </p:transition>

</xml_diff>